<commit_message>
Adds some more use cases in pptx. Adds some use cases in draw.io file Adds API design (example form chatgpt).
</commit_message>
<xml_diff>
--- a/Modul-223-Backend/Project Specification/System-Design/Wyzen_System-design_Guide.pptx
+++ b/Modul-223-Backend/Project Specification/System-Design/Wyzen_System-design_Guide.pptx
@@ -107,6 +107,11 @@
       </a:defRPr>
     </a:lvl9pPr>
   </p:defaultTextStyle>
+  <p:extLst>
+    <p:ext uri="{EFAFB233-063F-42B5-8137-9DF3F51BA10A}">
+      <p15:sldGuideLst xmlns:p15="http://schemas.microsoft.com/office/powerpoint/2012/main"/>
+    </p:ext>
+  </p:extLst>
 </p:presentation>
 </file>
 
@@ -123,18 +128,18 @@
   <pc:docChgLst>
     <pc:chgData name="Yoel Arcos" userId="d576784509d69313" providerId="LiveId" clId="{5EC5E54F-09BF-4159-BCF3-F89A0C4EEFB4}"/>
     <pc:docChg chg="custSel addSld delSld modSld">
-      <pc:chgData name="Yoel Arcos" userId="d576784509d69313" providerId="LiveId" clId="{5EC5E54F-09BF-4159-BCF3-F89A0C4EEFB4}" dt="2025-01-01T12:55:09.482" v="1172" actId="20577"/>
+      <pc:chgData name="Yoel Arcos" userId="d576784509d69313" providerId="LiveId" clId="{5EC5E54F-09BF-4159-BCF3-F89A0C4EEFB4}" dt="2025-01-01T13:54:11.635" v="1337" actId="20577"/>
       <pc:docMkLst>
         <pc:docMk/>
       </pc:docMkLst>
       <pc:sldChg chg="modSp mod">
-        <pc:chgData name="Yoel Arcos" userId="d576784509d69313" providerId="LiveId" clId="{5EC5E54F-09BF-4159-BCF3-F89A0C4EEFB4}" dt="2025-01-01T12:53:51.711" v="896" actId="20577"/>
+        <pc:chgData name="Yoel Arcos" userId="d576784509d69313" providerId="LiveId" clId="{5EC5E54F-09BF-4159-BCF3-F89A0C4EEFB4}" dt="2025-01-01T13:54:11.635" v="1337" actId="20577"/>
         <pc:sldMkLst>
           <pc:docMk/>
           <pc:sldMk cId="2045071740" sldId="257"/>
         </pc:sldMkLst>
         <pc:spChg chg="mod">
-          <ac:chgData name="Yoel Arcos" userId="d576784509d69313" providerId="LiveId" clId="{5EC5E54F-09BF-4159-BCF3-F89A0C4EEFB4}" dt="2025-01-01T12:53:51.711" v="896" actId="20577"/>
+          <ac:chgData name="Yoel Arcos" userId="d576784509d69313" providerId="LiveId" clId="{5EC5E54F-09BF-4159-BCF3-F89A0C4EEFB4}" dt="2025-01-01T13:54:11.635" v="1337" actId="20577"/>
           <ac:spMkLst>
             <pc:docMk/>
             <pc:sldMk cId="2045071740" sldId="257"/>
@@ -150,7 +155,7 @@
         </pc:sldMkLst>
       </pc:sldChg>
       <pc:sldChg chg="modSp new mod">
-        <pc:chgData name="Yoel Arcos" userId="d576784509d69313" providerId="LiveId" clId="{5EC5E54F-09BF-4159-BCF3-F89A0C4EEFB4}" dt="2025-01-01T12:55:09.482" v="1172" actId="20577"/>
+        <pc:chgData name="Yoel Arcos" userId="d576784509d69313" providerId="LiveId" clId="{5EC5E54F-09BF-4159-BCF3-F89A0C4EEFB4}" dt="2025-01-01T13:36:00.940" v="1173" actId="33524"/>
         <pc:sldMkLst>
           <pc:docMk/>
           <pc:sldMk cId="1217439375" sldId="259"/>
@@ -164,7 +169,7 @@
           </ac:spMkLst>
         </pc:spChg>
         <pc:spChg chg="mod">
-          <ac:chgData name="Yoel Arcos" userId="d576784509d69313" providerId="LiveId" clId="{5EC5E54F-09BF-4159-BCF3-F89A0C4EEFB4}" dt="2025-01-01T12:55:09.482" v="1172" actId="20577"/>
+          <ac:chgData name="Yoel Arcos" userId="d576784509d69313" providerId="LiveId" clId="{5EC5E54F-09BF-4159-BCF3-F89A0C4EEFB4}" dt="2025-01-01T13:36:00.940" v="1173" actId="33524"/>
           <ac:spMkLst>
             <pc:docMk/>
             <pc:sldMk cId="1217439375" sldId="259"/>
@@ -4238,7 +4243,7 @@
         <p:spPr/>
         <p:txBody>
           <a:bodyPr>
-            <a:normAutofit fontScale="77500" lnSpcReduction="20000"/>
+            <a:normAutofit fontScale="62500" lnSpcReduction="20000"/>
           </a:bodyPr>
           <a:lstStyle/>
           <a:p>
@@ -4356,7 +4361,75 @@
           <a:p>
             <a:r>
               <a:rPr lang="de-DE" dirty="0"/>
-              <a:t>5. Es soll für mich möglich sein, gewisse </a:t>
+              <a:t>5. Ich will nach </a:t>
+            </a:r>
+            <a:r>
+              <a:rPr lang="de-DE" dirty="0">
+                <a:highlight>
+                  <a:srgbClr val="FFFF00"/>
+                </a:highlight>
+              </a:rPr>
+              <a:t>Pages</a:t>
+            </a:r>
+            <a:r>
+              <a:rPr lang="de-DE" dirty="0"/>
+              <a:t> </a:t>
+            </a:r>
+            <a:r>
+              <a:rPr lang="de-DE" dirty="0">
+                <a:highlight>
+                  <a:srgbClr val="FFFF00"/>
+                </a:highlight>
+              </a:rPr>
+              <a:t>suchen</a:t>
+            </a:r>
+            <a:r>
+              <a:rPr lang="de-DE" dirty="0"/>
+              <a:t> können (</a:t>
+            </a:r>
+            <a:r>
+              <a:rPr lang="de-DE" dirty="0" err="1"/>
+              <a:t>filter</a:t>
+            </a:r>
+            <a:r>
+              <a:rPr lang="de-DE" dirty="0"/>
+              <a:t>).</a:t>
+            </a:r>
+          </a:p>
+          <a:p>
+            <a:r>
+              <a:rPr lang="de-DE" dirty="0"/>
+              <a:t>6. Ich möchte je nach Berechtigung </a:t>
+            </a:r>
+            <a:r>
+              <a:rPr lang="de-DE" dirty="0">
+                <a:highlight>
+                  <a:srgbClr val="FFFF00"/>
+                </a:highlight>
+              </a:rPr>
+              <a:t>Pages</a:t>
+            </a:r>
+            <a:r>
+              <a:rPr lang="de-DE" dirty="0"/>
+              <a:t> </a:t>
+            </a:r>
+            <a:r>
+              <a:rPr lang="de-DE" dirty="0">
+                <a:highlight>
+                  <a:srgbClr val="FFFF00"/>
+                </a:highlight>
+              </a:rPr>
+              <a:t>löschen</a:t>
+            </a:r>
+            <a:r>
+              <a:rPr lang="de-DE" dirty="0"/>
+              <a:t> können.</a:t>
+            </a:r>
+          </a:p>
+          <a:p>
+            <a:r>
+              <a:rPr lang="de-DE" dirty="0"/>
+              <a:t>7. Es soll für mich möglich sein, gewisse </a:t>
             </a:r>
             <a:r>
               <a:rPr lang="de-DE" dirty="0">
@@ -4386,7 +4459,7 @@
           <a:p>
             <a:r>
               <a:rPr lang="de-DE" dirty="0"/>
-              <a:t>6. Auch </a:t>
+              <a:t>8. Auch </a:t>
             </a:r>
             <a:r>
               <a:rPr lang="de-DE" dirty="0">
@@ -4428,7 +4501,15 @@
           <a:p>
             <a:r>
               <a:rPr lang="de-DE" dirty="0"/>
-              <a:t>7. Ich möchte die </a:t>
+              <a:t>9</a:t>
+            </a:r>
+            <a:r>
+              <a:rPr lang="de-DE"/>
+              <a:t>. </a:t>
+            </a:r>
+            <a:r>
+              <a:rPr lang="de-DE" dirty="0"/>
+              <a:t>Ich möchte die </a:t>
             </a:r>
             <a:r>
               <a:rPr lang="de-DE" dirty="0">
@@ -4693,7 +4774,7 @@
             </a:r>
             <a:r>
               <a:rPr lang="de-CH" dirty="0"/>
-              <a:t> dürfen nicht all zu spezifisch aufgezeichnet werden, weil es hier eigentlich nur um das Verhalten «der Aufgabe» ist. Später beim Programmieren können wir selbst entscheiden wie wir mit Daten umgehen werden.</a:t>
+              <a:t> dürfen nicht all zu spezifisch aufgezeichnet werden, weil es hier eigentlich nur um das Verhalten «der Aufgabe» ist. Später beim Programmieren können wir selbst entscheiden, wie wir mit Daten umgehen werden.</a:t>
             </a:r>
           </a:p>
           <a:p>

</xml_diff>